<commit_message>
Update Hardware_Johanna_Frank_Floris/Documentation/.gitkeep, Hardware_Johanna_Frank_Floris/Documentation/Personal_goals_Johanna.md, Hardware_Johanna_Frank_Floris/Documentation/Project_goals.md, Hardware_Johanna_Frank_Floris/Mentor_meetings/Notes_week_3.md, Hardware_Johanna_Frank_Floris/.gitkeep, Hardware_Johanna_Frank_Floris/README.md, Hardware_Johanna_Frank_Floris/project_canvas.pptx, Hardware_Johanna_Frank_Floris/subproject_collection.md files Deleted Hardware/Mentor meetings/.gitkeep
</commit_message>
<xml_diff>
--- a/Coordination/_Templates/project_canvas.pptx
+++ b/Coordination/_Templates/project_canvas.pptx
@@ -242,6 +242,11 @@
       </a:defRPr>
     </a:lvl9pPr>
   </p:defaultTextStyle>
+  <p:extLst>
+    <p:ext uri="{EFAFB233-063F-42B5-8137-9DF3F51BA10A}">
+      <p15:sldGuideLst xmlns:p15="http://schemas.microsoft.com/office/powerpoint/2012/main"/>
+    </p:ext>
+  </p:extLst>
 </p:presentation>
 </file>
 
@@ -5717,7 +5722,7 @@
         </p:nvSpPr>
         <p:spPr>
           <a:xfrm>
-            <a:off x="809075" y="717175"/>
+            <a:off x="797875" y="851613"/>
             <a:ext cx="1389600" cy="2577300"/>
           </a:xfrm>
           <a:prstGeom prst="rect">
@@ -5744,7 +5749,7 @@
               <a:buNone/>
             </a:pPr>
             <a:r>
-              <a:rPr lang="en" sz="1200" dirty="0" smtClean="0">
+              <a:rPr lang="en" sz="1200" dirty="0">
                 <a:solidFill>
                   <a:srgbClr val="4A86E8"/>
                 </a:solidFill>
@@ -5753,7 +5758,117 @@
                 <a:cs typeface="Open Sans"/>
                 <a:sym typeface="Open Sans"/>
               </a:rPr>
-              <a:t> </a:t>
+              <a:t>Collecting/structure the ideas of the C</a:t>
+            </a:r>
+            <a:r>
+              <a:rPr lang="en-GB" sz="1200" dirty="0">
+                <a:solidFill>
+                  <a:srgbClr val="4A86E8"/>
+                </a:solidFill>
+                <a:latin typeface="Open Sans"/>
+                <a:ea typeface="Open Sans"/>
+                <a:cs typeface="Open Sans"/>
+                <a:sym typeface="Open Sans"/>
+              </a:rPr>
+              <a:t>o</a:t>
+            </a:r>
+            <a:r>
+              <a:rPr lang="en" sz="1200" dirty="0">
+                <a:solidFill>
+                  <a:srgbClr val="4A86E8"/>
+                </a:solidFill>
+                <a:latin typeface="Open Sans"/>
+                <a:ea typeface="Open Sans"/>
+                <a:cs typeface="Open Sans"/>
+                <a:sym typeface="Open Sans"/>
+              </a:rPr>
+              <a:t>hort </a:t>
+            </a:r>
+          </a:p>
+          <a:p>
+            <a:pPr marL="0" lvl="0" indent="0" algn="l" rtl="0">
+              <a:spcBef>
+                <a:spcPts val="0"/>
+              </a:spcBef>
+              <a:spcAft>
+                <a:spcPts val="0"/>
+              </a:spcAft>
+              <a:buNone/>
+            </a:pPr>
+            <a:endParaRPr lang="en" sz="1200" dirty="0">
+              <a:solidFill>
+                <a:srgbClr val="4A86E8"/>
+              </a:solidFill>
+              <a:latin typeface="Open Sans"/>
+              <a:ea typeface="Open Sans"/>
+              <a:cs typeface="Open Sans"/>
+              <a:sym typeface="Open Sans"/>
+            </a:endParaRPr>
+          </a:p>
+          <a:p>
+            <a:pPr marL="0" lvl="0" indent="0" algn="l" rtl="0">
+              <a:spcBef>
+                <a:spcPts val="0"/>
+              </a:spcBef>
+              <a:spcAft>
+                <a:spcPts val="0"/>
+              </a:spcAft>
+              <a:buNone/>
+            </a:pPr>
+            <a:r>
+              <a:rPr lang="en" sz="1200" dirty="0">
+                <a:solidFill>
+                  <a:srgbClr val="4A86E8"/>
+                </a:solidFill>
+                <a:latin typeface="Open Sans"/>
+                <a:ea typeface="Open Sans"/>
+                <a:cs typeface="Open Sans"/>
+                <a:sym typeface="Open Sans"/>
+              </a:rPr>
+              <a:t>Provide the hardware for data transfer/display</a:t>
+            </a:r>
+          </a:p>
+          <a:p>
+            <a:pPr marL="0" lvl="0" indent="0" algn="l" rtl="0">
+              <a:spcBef>
+                <a:spcPts val="0"/>
+              </a:spcBef>
+              <a:spcAft>
+                <a:spcPts val="0"/>
+              </a:spcAft>
+              <a:buNone/>
+            </a:pPr>
+            <a:endParaRPr lang="en" sz="1200" dirty="0">
+              <a:solidFill>
+                <a:srgbClr val="4A86E8"/>
+              </a:solidFill>
+              <a:latin typeface="Open Sans"/>
+              <a:ea typeface="Open Sans"/>
+              <a:cs typeface="Open Sans"/>
+              <a:sym typeface="Open Sans"/>
+            </a:endParaRPr>
+          </a:p>
+          <a:p>
+            <a:pPr marL="0" lvl="0" indent="0" algn="l" rtl="0">
+              <a:spcBef>
+                <a:spcPts val="0"/>
+              </a:spcBef>
+              <a:spcAft>
+                <a:spcPts val="0"/>
+              </a:spcAft>
+              <a:buNone/>
+            </a:pPr>
+            <a:r>
+              <a:rPr lang="en" sz="1200" dirty="0">
+                <a:solidFill>
+                  <a:srgbClr val="4A86E8"/>
+                </a:solidFill>
+                <a:latin typeface="Open Sans"/>
+                <a:ea typeface="Open Sans"/>
+                <a:cs typeface="Open Sans"/>
+                <a:sym typeface="Open Sans"/>
+              </a:rPr>
+              <a:t>Install the hardware </a:t>
             </a:r>
             <a:endParaRPr sz="1200" dirty="0">
               <a:solidFill>
@@ -5801,6 +5916,64 @@
               </a:spcAft>
               <a:buNone/>
             </a:pPr>
+            <a:r>
+              <a:rPr lang="en" sz="1200" dirty="0">
+                <a:solidFill>
+                  <a:srgbClr val="4A86E8"/>
+                </a:solidFill>
+                <a:latin typeface="Open Sans"/>
+                <a:ea typeface="Open Sans"/>
+                <a:cs typeface="Open Sans"/>
+                <a:sym typeface="Open Sans"/>
+              </a:rPr>
+              <a:t>Outline the parts of experiment(s)</a:t>
+            </a:r>
+          </a:p>
+          <a:p>
+            <a:pPr marL="0" lvl="0" indent="0" algn="l" rtl="0">
+              <a:spcBef>
+                <a:spcPts val="0"/>
+              </a:spcBef>
+              <a:spcAft>
+                <a:spcPts val="0"/>
+              </a:spcAft>
+              <a:buNone/>
+            </a:pPr>
+            <a:r>
+              <a:rPr lang="de-DE" sz="1200" dirty="0">
+                <a:solidFill>
+                  <a:srgbClr val="4A86E8"/>
+                </a:solidFill>
+                <a:latin typeface="Open Sans"/>
+                <a:ea typeface="Open Sans"/>
+                <a:cs typeface="Open Sans"/>
+                <a:sym typeface="Open Sans"/>
+              </a:rPr>
+              <a:t>-&gt;Collecting whats needed,</a:t>
+            </a:r>
+          </a:p>
+          <a:p>
+            <a:pPr marL="0" lvl="0" indent="0" algn="l" rtl="0">
+              <a:spcBef>
+                <a:spcPts val="0"/>
+              </a:spcBef>
+              <a:spcAft>
+                <a:spcPts val="0"/>
+              </a:spcAft>
+              <a:buNone/>
+            </a:pPr>
+            <a:r>
+              <a:rPr lang="de-DE" sz="1200" dirty="0">
+                <a:solidFill>
+                  <a:srgbClr val="4A86E8"/>
+                </a:solidFill>
+                <a:latin typeface="Open Sans"/>
+                <a:ea typeface="Open Sans"/>
+                <a:cs typeface="Open Sans"/>
+                <a:sym typeface="Open Sans"/>
+              </a:rPr>
+              <a:t>wire the sub and central facillities </a:t>
+            </a:r>
             <a:endParaRPr sz="1200" dirty="0">
               <a:solidFill>
                 <a:srgbClr val="4A86E8"/>
@@ -5821,7 +5994,7 @@
         </p:nvSpPr>
         <p:spPr>
           <a:xfrm>
-            <a:off x="2232225" y="2196350"/>
+            <a:off x="2215749" y="2179874"/>
             <a:ext cx="1389600" cy="1098000"/>
           </a:xfrm>
           <a:prstGeom prst="rect">
@@ -5847,6 +6020,18 @@
               </a:spcAft>
               <a:buNone/>
             </a:pPr>
+            <a:r>
+              <a:rPr lang="de-DE" sz="1200" dirty="0">
+                <a:solidFill>
+                  <a:srgbClr val="4A86E8"/>
+                </a:solidFill>
+                <a:latin typeface="Open Sans"/>
+                <a:ea typeface="Open Sans"/>
+                <a:cs typeface="Open Sans"/>
+                <a:sym typeface="Open Sans"/>
+              </a:rPr>
+              <a:t>The data transfer has to work</a:t>
+            </a:r>
             <a:endParaRPr sz="1200" dirty="0">
               <a:solidFill>
                 <a:srgbClr val="4A86E8"/>
@@ -5893,7 +6078,77 @@
               </a:spcAft>
               <a:buNone/>
             </a:pPr>
-            <a:endParaRPr sz="1200" dirty="0">
+            <a:r>
+              <a:rPr lang="de-DE" sz="1200" dirty="0">
+                <a:solidFill>
+                  <a:srgbClr val="4A86E8"/>
+                </a:solidFill>
+                <a:latin typeface="Open Sans"/>
+                <a:ea typeface="Open Sans"/>
+                <a:cs typeface="Open Sans"/>
+                <a:sym typeface="Open Sans"/>
+              </a:rPr>
+              <a:t>Your subproject informations,</a:t>
+            </a:r>
+          </a:p>
+          <a:p>
+            <a:pPr marL="0" lvl="0" indent="0" algn="l" rtl="0">
+              <a:spcBef>
+                <a:spcPts val="0"/>
+              </a:spcBef>
+              <a:spcAft>
+                <a:spcPts val="0"/>
+              </a:spcAft>
+              <a:buNone/>
+            </a:pPr>
+            <a:r>
+              <a:rPr lang="de-DE" sz="1200" dirty="0">
+                <a:solidFill>
+                  <a:srgbClr val="4A86E8"/>
+                </a:solidFill>
+                <a:latin typeface="Open Sans"/>
+                <a:ea typeface="Open Sans"/>
+                <a:cs typeface="Open Sans"/>
+                <a:sym typeface="Open Sans"/>
+              </a:rPr>
+              <a:t>Wires (…),</a:t>
+            </a:r>
+          </a:p>
+          <a:p>
+            <a:pPr marL="0" lvl="0" indent="0" algn="l" rtl="0">
+              <a:spcBef>
+                <a:spcPts val="0"/>
+              </a:spcBef>
+              <a:spcAft>
+                <a:spcPts val="0"/>
+              </a:spcAft>
+              <a:buNone/>
+            </a:pPr>
+            <a:r>
+              <a:rPr lang="de-DE" sz="1200" dirty="0">
+                <a:solidFill>
+                  <a:srgbClr val="4A86E8"/>
+                </a:solidFill>
+                <a:latin typeface="Open Sans"/>
+                <a:ea typeface="Open Sans"/>
+                <a:cs typeface="Open Sans"/>
+                <a:sym typeface="Open Sans"/>
+              </a:rPr>
+              <a:t>Rasperry Pi, SD</a:t>
+            </a:r>
+            <a:r>
+              <a:rPr lang="de-DE" sz="1200">
+                <a:solidFill>
+                  <a:srgbClr val="4A86E8"/>
+                </a:solidFill>
+                <a:latin typeface="Open Sans"/>
+                <a:ea typeface="Open Sans"/>
+                <a:cs typeface="Open Sans"/>
+                <a:sym typeface="Open Sans"/>
+              </a:rPr>
+              <a:t>, Software, Screen</a:t>
+            </a:r>
+            <a:endParaRPr lang="de-DE" sz="1200" dirty="0">
               <a:solidFill>
                 <a:srgbClr val="4A86E8"/>
               </a:solidFill>
@@ -6174,6 +6429,49 @@
               <a:t>See next slide for instructions!</a:t>
             </a:r>
             <a:endParaRPr sz="1300"/>
+          </a:p>
+        </p:txBody>
+      </p:sp>
+      <p:sp>
+        <p:nvSpPr>
+          <p:cNvPr id="3" name="TextBox 2">
+            <a:extLst>
+              <a:ext uri="{FF2B5EF4-FFF2-40B4-BE49-F238E27FC236}">
+                <a16:creationId xmlns:a16="http://schemas.microsoft.com/office/drawing/2014/main" id="{6CBCDE75-6DB8-4141-AB4E-20A00527731D}"/>
+              </a:ext>
+            </a:extLst>
+          </p:cNvPr>
+          <p:cNvSpPr txBox="1"/>
+          <p:nvPr/>
+        </p:nvSpPr>
+        <p:spPr>
+          <a:xfrm>
+            <a:off x="4786183" y="51486"/>
+            <a:ext cx="1828800" cy="307777"/>
+          </a:xfrm>
+          <a:prstGeom prst="rect">
+            <a:avLst/>
+          </a:prstGeom>
+          <a:noFill/>
+        </p:spPr>
+        <p:txBody>
+          <a:bodyPr wrap="square" rtlCol="0">
+            <a:spAutoFit/>
+          </a:bodyPr>
+          <a:lstStyle/>
+          <a:p>
+            <a:r>
+              <a:rPr lang="en-US" sz="1400" b="0" i="0" u="none" strike="noStrike" cap="none" dirty="0">
+                <a:solidFill>
+                  <a:srgbClr val="000000"/>
+                </a:solidFill>
+                <a:latin typeface="Arial"/>
+                <a:ea typeface="Arial"/>
+                <a:cs typeface="Arial"/>
+                <a:sym typeface="Arial"/>
+              </a:rPr>
+              <a:t>Hardware</a:t>
+            </a:r>
           </a:p>
         </p:txBody>
       </p:sp>

</xml_diff>